<commit_message>
MAJ powerpoint avant d'envoyer a haddad
</commit_message>
<xml_diff>
--- a/Diapo-&-co/150224 P4 Info 1.pptx
+++ b/Diapo-&-co/150224 P4 Info 1.pptx
@@ -3543,11 +3543,7 @@
           <a:p>
             <a:r>
               <a:rPr lang="fr-FR" sz="2400" dirty="0" smtClean="0"/>
-              <a:t>24</a:t>
-            </a:r>
-            <a:r>
-              <a:rPr lang="fr-FR" sz="2400" dirty="0" smtClean="0"/>
-              <a:t>/02/2015</a:t>
+              <a:t>24/02/2015</a:t>
             </a:r>
             <a:endParaRPr lang="fr-FR" sz="2400" dirty="0"/>
           </a:p>
@@ -3654,8 +3650,12 @@
           <a:lstStyle/>
           <a:p>
             <a:r>
-              <a:rPr lang="fr-FR" dirty="0" smtClean="0"/>
+              <a:rPr lang="fr-FR" u="sng" dirty="0" smtClean="0"/>
               <a:t>Ce qui a déjà été fait</a:t>
+            </a:r>
+            <a:r>
+              <a:rPr lang="fr-FR" dirty="0" smtClean="0"/>
+              <a:t/>
             </a:r>
             <a:br>
               <a:rPr lang="fr-FR" dirty="0" smtClean="0"/>
@@ -3977,8 +3977,12 @@
           <a:lstStyle/>
           <a:p>
             <a:r>
-              <a:rPr lang="fr-FR" dirty="0" smtClean="0"/>
+              <a:rPr lang="fr-FR" u="sng" dirty="0" smtClean="0"/>
               <a:t>Ce qui a déjà été fait</a:t>
+            </a:r>
+            <a:r>
+              <a:rPr lang="fr-FR" dirty="0" smtClean="0"/>
+              <a:t/>
             </a:r>
             <a:br>
               <a:rPr lang="fr-FR" dirty="0" smtClean="0"/>
@@ -4031,15 +4035,7 @@
             </a:pPr>
             <a:r>
               <a:rPr lang="fr-FR" dirty="0" smtClean="0"/>
-              <a:t>Nous sommes partis du jeu de Dames, donné par M</a:t>
-            </a:r>
-            <a:r>
-              <a:rPr lang="fr-FR" dirty="0" smtClean="0"/>
-              <a:t>. Haddad </a:t>
-            </a:r>
-            <a:r>
-              <a:rPr lang="fr-FR" dirty="0" smtClean="0"/>
-              <a:t>et nous avons :</a:t>
+              <a:t>Nous sommes partis du jeu de Dames, donné par M. Haddad et nous avons :</a:t>
             </a:r>
           </a:p>
           <a:p>
@@ -4065,15 +4061,7 @@
             </a:pPr>
             <a:r>
               <a:rPr lang="fr-FR" dirty="0" smtClean="0"/>
-              <a:t>Implémenté </a:t>
-            </a:r>
-            <a:r>
-              <a:rPr lang="fr-FR" dirty="0" smtClean="0"/>
-              <a:t>de nouvelles fonctionnalités (manger plusieurs pions à la suites, en arrière</a:t>
-            </a:r>
-            <a:r>
-              <a:rPr lang="fr-FR" dirty="0" smtClean="0"/>
-              <a:t>…)</a:t>
+              <a:t>Implémenté de nouvelles fonctionnalités (manger plusieurs pions à la suites, en arrière…)</a:t>
             </a:r>
           </a:p>
           <a:p>
@@ -4088,7 +4076,6 @@
               <a:rPr lang="fr-FR" dirty="0" smtClean="0"/>
               <a:t>Créé une IA basique (manger un pion si possible, sinon déplacement aléatoire)</a:t>
             </a:r>
-            <a:endParaRPr lang="fr-FR" dirty="0" smtClean="0"/>
           </a:p>
           <a:p>
             <a:pPr marL="457200" lvl="1" indent="0">
@@ -4223,8 +4210,12 @@
           <a:lstStyle/>
           <a:p>
             <a:r>
-              <a:rPr lang="fr-FR" dirty="0" smtClean="0"/>
+              <a:rPr lang="fr-FR" u="sng" dirty="0" smtClean="0"/>
               <a:t>Ce qu’il reste à faire</a:t>
+            </a:r>
+            <a:r>
+              <a:rPr lang="fr-FR" dirty="0" smtClean="0"/>
+              <a:t/>
             </a:r>
             <a:br>
               <a:rPr lang="fr-FR" dirty="0" smtClean="0"/>
@@ -4781,7 +4772,15 @@
             <a:pPr lvl="1"/>
             <a:r>
               <a:rPr lang="fr-FR" dirty="0" smtClean="0"/>
-              <a:t>Avec le responsable du projet (Mr HADDAD) : par mail</a:t>
+              <a:t>Avec le responsable du projet (</a:t>
+            </a:r>
+            <a:r>
+              <a:rPr lang="fr-FR" dirty="0" smtClean="0"/>
+              <a:t>M. </a:t>
+            </a:r>
+            <a:r>
+              <a:rPr lang="fr-FR" dirty="0" smtClean="0"/>
+              <a:t>HADDAD) : par mail</a:t>
             </a:r>
           </a:p>
           <a:p>
@@ -4967,21 +4966,13 @@
           <a:p>
             <a:r>
               <a:rPr lang="fr-FR" dirty="0" smtClean="0"/>
-              <a:t>Le jeu de Quarto </a:t>
-            </a:r>
-            <a:r>
-              <a:rPr lang="fr-FR" dirty="0" smtClean="0"/>
-              <a:t>hébergé </a:t>
-            </a:r>
-            <a:r>
-              <a:rPr lang="fr-FR" dirty="0" smtClean="0"/>
-              <a:t>à quarto.freehostia.com qui nous permet de comprendre et prendre en main le jeu.</a:t>
-            </a:r>
-          </a:p>
-          <a:p>
-            <a:r>
-              <a:rPr lang="fr-FR" dirty="0" err="1" smtClean="0"/>
-              <a:t>Mr.Haddad</a:t>
+              <a:t>Le jeu de Quarto hébergé à quarto.freehostia.com qui nous permet de comprendre et prendre en main le jeu.</a:t>
+            </a:r>
+          </a:p>
+          <a:p>
+            <a:r>
+              <a:rPr lang="fr-FR" dirty="0" smtClean="0"/>
+              <a:t>M. Haddad</a:t>
             </a:r>
             <a:r>
               <a:rPr lang="fr-FR" dirty="0" smtClean="0"/>
@@ -5729,13 +5720,7 @@
               <a:rPr lang="fr-FR" sz="2200" dirty="0" smtClean="0">
                 <a:latin typeface="+mn-lt"/>
               </a:rPr>
-              <a:t>Création </a:t>
-            </a:r>
-            <a:r>
-              <a:rPr lang="fr-FR" sz="2200" dirty="0" smtClean="0">
-                <a:latin typeface="+mn-lt"/>
-              </a:rPr>
-              <a:t>d’une Intelligence Artificielle contre laquelle  un utilisateur pourra jouer. (Cette dernière sera pourvu de plusieurs niveaux)</a:t>
+              <a:t>Création d’une Intelligence Artificielle contre laquelle  un utilisateur pourra jouer. (Cette dernière sera pourvu de plusieurs niveaux)</a:t>
             </a:r>
             <a:endParaRPr lang="fr-FR" sz="2200" dirty="0">
               <a:latin typeface="+mn-lt"/>
@@ -7027,8 +7012,13 @@
           <a:p>
             <a:r>
               <a:rPr lang="fr-FR" dirty="0" smtClean="0"/>
-              <a:t>Choix de l’environnement de développement : Eclipse</a:t>
-            </a:r>
+              <a:t>Choix de l’environnement de développement : </a:t>
+            </a:r>
+            <a:r>
+              <a:rPr lang="fr-FR" dirty="0" err="1" smtClean="0"/>
+              <a:t>NetBeans</a:t>
+            </a:r>
+            <a:endParaRPr lang="fr-FR" dirty="0" smtClean="0"/>
           </a:p>
           <a:p>
             <a:endParaRPr lang="fr-FR" dirty="0" smtClean="0"/>
@@ -7171,43 +7161,26 @@
       </p:pic>
       <p:pic>
         <p:nvPicPr>
-          <p:cNvPr id="1030" name="Picture 6" descr="Fichier:Eclipse Logo.svg"/>
+          <p:cNvPr id="7" name="Image 6"/>
           <p:cNvPicPr>
-            <a:picLocks noChangeAspect="1" noChangeArrowheads="1"/>
+            <a:picLocks noChangeAspect="1"/>
           </p:cNvPicPr>
           <p:nvPr/>
         </p:nvPicPr>
         <p:blipFill>
-          <a:blip r:embed="rId3">
-            <a:extLst>
-              <a:ext uri="{28A0092B-C50C-407E-A947-70E740481C1C}">
-                <a14:useLocalDpi xmlns:a14="http://schemas.microsoft.com/office/drawing/2010/main" val="0"/>
-              </a:ext>
-            </a:extLst>
-          </a:blip>
-          <a:srcRect/>
+          <a:blip r:embed="rId3"/>
           <a:stretch>
             <a:fillRect/>
           </a:stretch>
         </p:blipFill>
-        <p:spPr bwMode="auto">
+        <p:spPr>
           <a:xfrm>
-            <a:off x="7166919" y="3280766"/>
-            <a:ext cx="3677680" cy="860734"/>
+            <a:off x="8496300" y="3149578"/>
+            <a:ext cx="2857500" cy="1571625"/>
           </a:xfrm>
           <a:prstGeom prst="rect">
             <a:avLst/>
           </a:prstGeom>
-          <a:noFill/>
-          <a:extLst>
-            <a:ext uri="{909E8E84-426E-40DD-AFC4-6F175D3DCCD1}">
-              <a14:hiddenFill xmlns:a14="http://schemas.microsoft.com/office/drawing/2010/main">
-                <a:solidFill>
-                  <a:srgbClr val="FFFFFF"/>
-                </a:solidFill>
-              </a14:hiddenFill>
-            </a:ext>
-          </a:extLst>
         </p:spPr>
       </p:pic>
     </p:spTree>

</xml_diff>